<commit_message>
Minor modifications to sessions 2 & 3
</commit_message>
<xml_diff>
--- a/fundamentals/3-Binary Numbers, Operations, Conditionals.pptx
+++ b/fundamentals/3-Binary Numbers, Operations, Conditionals.pptx
@@ -5,7 +5,7 @@
     <p:sldMasterId id="2147483954" r:id="rId1"/>
   </p:sldMasterIdLst>
   <p:notesMasterIdLst>
-    <p:notesMasterId r:id="rId15"/>
+    <p:notesMasterId r:id="rId16"/>
   </p:notesMasterIdLst>
   <p:sldIdLst>
     <p:sldId id="256" r:id="rId2"/>
@@ -21,6 +21,7 @@
     <p:sldId id="277" r:id="rId12"/>
     <p:sldId id="285" r:id="rId13"/>
     <p:sldId id="270" r:id="rId14"/>
+    <p:sldId id="280" r:id="rId15"/>
   </p:sldIdLst>
   <p:sldSz cx="12192000" cy="6858000"/>
   <p:notesSz cx="6858000" cy="9144000"/>
@@ -212,7 +213,7 @@
           <a:p>
             <a:fld id="{720C9186-47A3-C54A-A8AF-47B660C0099D}" type="datetimeFigureOut">
               <a:rPr lang="en-US" smtClean="0"/>
-              <a:t>6/17/20</a:t>
+              <a:t>7/5/20</a:t>
             </a:fld>
             <a:endParaRPr lang="en-US"/>
           </a:p>
@@ -641,7 +642,7 @@
           <a:p>
             <a:fld id="{4AAD347D-5ACD-4C99-B74B-A9C85AD731AF}" type="datetimeFigureOut">
               <a:rPr lang="en-US" smtClean="0"/>
-              <a:t>6/17/20</a:t>
+              <a:t>7/5/20</a:t>
             </a:fld>
             <a:endParaRPr lang="en-US" dirty="0"/>
           </a:p>
@@ -841,7 +842,7 @@
           <a:p>
             <a:fld id="{4AAD347D-5ACD-4C99-B74B-A9C85AD731AF}" type="datetimeFigureOut">
               <a:rPr lang="en-US" smtClean="0"/>
-              <a:t>6/17/20</a:t>
+              <a:t>7/5/20</a:t>
             </a:fld>
             <a:endParaRPr lang="en-US" dirty="0"/>
           </a:p>
@@ -1052,7 +1053,7 @@
           <a:p>
             <a:fld id="{4AAD347D-5ACD-4C99-B74B-A9C85AD731AF}" type="datetimeFigureOut">
               <a:rPr lang="en-US" smtClean="0"/>
-              <a:t>6/17/20</a:t>
+              <a:t>7/5/20</a:t>
             </a:fld>
             <a:endParaRPr lang="en-US" dirty="0"/>
           </a:p>
@@ -1309,7 +1310,7 @@
           <a:p>
             <a:fld id="{4AAD347D-5ACD-4C99-B74B-A9C85AD731AF}" type="datetimeFigureOut">
               <a:rPr lang="en-US" smtClean="0"/>
-              <a:t>6/17/20</a:t>
+              <a:t>7/5/20</a:t>
             </a:fld>
             <a:endParaRPr lang="en-US" dirty="0"/>
           </a:p>
@@ -1592,7 +1593,7 @@
           <a:p>
             <a:fld id="{9796027F-7875-4030-9381-8BD8C4F21935}" type="datetimeFigureOut">
               <a:rPr lang="en-US" smtClean="0"/>
-              <a:t>6/17/20</a:t>
+              <a:t>7/5/20</a:t>
             </a:fld>
             <a:endParaRPr lang="en-US" dirty="0"/>
           </a:p>
@@ -1860,7 +1861,7 @@
           <a:p>
             <a:fld id="{4AAD347D-5ACD-4C99-B74B-A9C85AD731AF}" type="datetimeFigureOut">
               <a:rPr lang="en-US" smtClean="0"/>
-              <a:t>6/17/20</a:t>
+              <a:t>7/5/20</a:t>
             </a:fld>
             <a:endParaRPr lang="en-US" dirty="0"/>
           </a:p>
@@ -2281,7 +2282,7 @@
           <a:p>
             <a:fld id="{4AAD347D-5ACD-4C99-B74B-A9C85AD731AF}" type="datetimeFigureOut">
               <a:rPr lang="en-US" smtClean="0"/>
-              <a:t>6/17/20</a:t>
+              <a:t>7/5/20</a:t>
             </a:fld>
             <a:endParaRPr lang="en-US" dirty="0"/>
           </a:p>
@@ -2424,7 +2425,7 @@
           <a:p>
             <a:fld id="{4509A250-FF31-4206-8172-F9D3106AACB1}" type="datetimeFigureOut">
               <a:rPr lang="en-US" smtClean="0"/>
-              <a:t>6/17/20</a:t>
+              <a:t>7/5/20</a:t>
             </a:fld>
             <a:endParaRPr lang="en-US" dirty="0"/>
           </a:p>
@@ -2537,7 +2538,7 @@
           <a:p>
             <a:fld id="{4509A250-FF31-4206-8172-F9D3106AACB1}" type="datetimeFigureOut">
               <a:rPr lang="en-US" smtClean="0"/>
-              <a:t>6/17/20</a:t>
+              <a:t>7/5/20</a:t>
             </a:fld>
             <a:endParaRPr lang="en-US" dirty="0"/>
           </a:p>
@@ -2850,7 +2851,7 @@
           <a:p>
             <a:fld id="{4AAD347D-5ACD-4C99-B74B-A9C85AD731AF}" type="datetimeFigureOut">
               <a:rPr lang="en-US" smtClean="0"/>
-              <a:t>6/17/20</a:t>
+              <a:t>7/5/20</a:t>
             </a:fld>
             <a:endParaRPr lang="en-US" dirty="0"/>
           </a:p>
@@ -3145,7 +3146,7 @@
           <a:p>
             <a:fld id="{4509A250-FF31-4206-8172-F9D3106AACB1}" type="datetimeFigureOut">
               <a:rPr lang="en-US" smtClean="0"/>
-              <a:t>6/17/20</a:t>
+              <a:t>7/5/20</a:t>
             </a:fld>
             <a:endParaRPr lang="en-US" dirty="0"/>
           </a:p>
@@ -3388,7 +3389,7 @@
           <a:p>
             <a:fld id="{4AAD347D-5ACD-4C99-B74B-A9C85AD731AF}" type="datetimeFigureOut">
               <a:rPr lang="en-US" smtClean="0"/>
-              <a:t>6/17/20</a:t>
+              <a:t>7/5/20</a:t>
             </a:fld>
             <a:endParaRPr lang="en-US" dirty="0"/>
           </a:p>
@@ -6371,6 +6372,168 @@
     <p:extLst>
       <p:ext uri="{BB962C8B-B14F-4D97-AF65-F5344CB8AC3E}">
         <p14:creationId xmlns:p14="http://schemas.microsoft.com/office/powerpoint/2010/main" val="3547435381"/>
+      </p:ext>
+    </p:extLst>
+  </p:cSld>
+  <p:clrMapOvr>
+    <a:masterClrMapping/>
+  </p:clrMapOvr>
+</p:sld>
+</file>
+
+<file path=ppt/slides/slide14.xml><?xml version="1.0" encoding="utf-8"?>
+<p:sld xmlns:a="http://schemas.openxmlformats.org/drawingml/2006/main" xmlns:r="http://schemas.openxmlformats.org/officeDocument/2006/relationships" xmlns:p="http://schemas.openxmlformats.org/presentationml/2006/main">
+  <p:cSld>
+    <p:spTree>
+      <p:nvGrpSpPr>
+        <p:cNvPr id="1" name=""/>
+        <p:cNvGrpSpPr/>
+        <p:nvPr/>
+      </p:nvGrpSpPr>
+      <p:grpSpPr>
+        <a:xfrm>
+          <a:off x="0" y="0"/>
+          <a:ext cx="0" cy="0"/>
+          <a:chOff x="0" y="0"/>
+          <a:chExt cx="0" cy="0"/>
+        </a:xfrm>
+      </p:grpSpPr>
+      <p:sp>
+        <p:nvSpPr>
+          <p:cNvPr id="2" name="Title 1">
+            <a:extLst>
+              <a:ext uri="{FF2B5EF4-FFF2-40B4-BE49-F238E27FC236}">
+                <a16:creationId xmlns:a16="http://schemas.microsoft.com/office/drawing/2014/main" id="{A0A9ADA6-4AC5-1B4C-8B4D-A660FDFE89F6}"/>
+              </a:ext>
+            </a:extLst>
+          </p:cNvPr>
+          <p:cNvSpPr>
+            <a:spLocks noGrp="1"/>
+          </p:cNvSpPr>
+          <p:nvPr>
+            <p:ph type="title"/>
+          </p:nvPr>
+        </p:nvSpPr>
+        <p:spPr>
+          <a:xfrm>
+            <a:off x="1175512" y="870132"/>
+            <a:ext cx="9792208" cy="1527078"/>
+          </a:xfrm>
+        </p:spPr>
+        <p:txBody>
+          <a:bodyPr>
+            <a:normAutofit/>
+          </a:bodyPr>
+          <a:lstStyle/>
+          <a:p>
+            <a:r>
+              <a:rPr lang="en-US" dirty="0"/>
+              <a:t>More …</a:t>
+            </a:r>
+          </a:p>
+        </p:txBody>
+      </p:sp>
+      <p:sp>
+        <p:nvSpPr>
+          <p:cNvPr id="3" name="Content Placeholder 2">
+            <a:extLst>
+              <a:ext uri="{FF2B5EF4-FFF2-40B4-BE49-F238E27FC236}">
+                <a16:creationId xmlns:a16="http://schemas.microsoft.com/office/drawing/2014/main" id="{1338A229-F889-2D44-93A4-E978CAE2312A}"/>
+              </a:ext>
+            </a:extLst>
+          </p:cNvPr>
+          <p:cNvSpPr>
+            <a:spLocks noGrp="1"/>
+          </p:cNvSpPr>
+          <p:nvPr>
+            <p:ph idx="1"/>
+          </p:nvPr>
+        </p:nvSpPr>
+        <p:spPr>
+          <a:xfrm>
+            <a:off x="1175512" y="2557849"/>
+            <a:ext cx="9792208" cy="3407862"/>
+          </a:xfrm>
+        </p:spPr>
+        <p:txBody>
+          <a:bodyPr>
+            <a:normAutofit fontScale="70000" lnSpcReduction="20000"/>
+          </a:bodyPr>
+          <a:lstStyle/>
+          <a:p>
+            <a:r>
+              <a:rPr lang="en-US" dirty="0"/>
+              <a:t>Use </a:t>
+            </a:r>
+            <a:r>
+              <a:rPr lang="en-US" b="1" dirty="0"/>
+              <a:t>bitwise operator(s)</a:t>
+            </a:r>
+            <a:r>
+              <a:rPr lang="en-US" dirty="0"/>
+              <a:t> to</a:t>
+            </a:r>
+          </a:p>
+          <a:p>
+            <a:r>
+              <a:rPr lang="en-US" dirty="0"/>
+              <a:t>Check if a number is even</a:t>
+            </a:r>
+          </a:p>
+          <a:p>
+            <a:r>
+              <a:rPr lang="en-US" dirty="0"/>
+              <a:t>Check if a number is odd</a:t>
+            </a:r>
+          </a:p>
+          <a:p>
+            <a:r>
+              <a:rPr lang="en-US" dirty="0"/>
+              <a:t>Check if a number is a power of 2</a:t>
+            </a:r>
+          </a:p>
+          <a:p>
+            <a:r>
+              <a:rPr lang="en-US" dirty="0"/>
+              <a:t>Check if a number can be represented by 1 byte</a:t>
+            </a:r>
+          </a:p>
+          <a:p>
+            <a:r>
+              <a:rPr lang="en-US" dirty="0"/>
+              <a:t>Check if a number can be represented by 2 bytes</a:t>
+            </a:r>
+          </a:p>
+          <a:p>
+            <a:r>
+              <a:rPr lang="en-US" dirty="0"/>
+              <a:t>Check if a number can be represented by 4 bytes</a:t>
+            </a:r>
+          </a:p>
+          <a:p>
+            <a:r>
+              <a:rPr lang="en-US" dirty="0"/>
+              <a:t>Check if a number can be represented by 8 bytes</a:t>
+            </a:r>
+          </a:p>
+          <a:p>
+            <a:endParaRPr lang="en-US" dirty="0"/>
+          </a:p>
+          <a:p>
+            <a:r>
+              <a:rPr lang="en-US" i="1" dirty="0"/>
+              <a:t>Pen + Paper is fine but if you can REPLT it, then super !</a:t>
+            </a:r>
+          </a:p>
+          <a:p>
+            <a:endParaRPr lang="en-US" dirty="0"/>
+          </a:p>
+        </p:txBody>
+      </p:sp>
+    </p:spTree>
+    <p:extLst>
+      <p:ext uri="{BB962C8B-B14F-4D97-AF65-F5344CB8AC3E}">
+        <p14:creationId xmlns:p14="http://schemas.microsoft.com/office/powerpoint/2010/main" val="1593349366"/>
       </p:ext>
     </p:extLst>
   </p:cSld>

</xml_diff>

<commit_message>
Visual examples to sessions 2 & 3
</commit_message>
<xml_diff>
--- a/fundamentals/3-Binary Numbers, Operations, Conditionals.pptx
+++ b/fundamentals/3-Binary Numbers, Operations, Conditionals.pptx
@@ -5,7 +5,7 @@
     <p:sldMasterId id="2147483954" r:id="rId1"/>
   </p:sldMasterIdLst>
   <p:notesMasterIdLst>
-    <p:notesMasterId r:id="rId16"/>
+    <p:notesMasterId r:id="rId18"/>
   </p:notesMasterIdLst>
   <p:sldIdLst>
     <p:sldId id="256" r:id="rId2"/>
@@ -19,9 +19,11 @@
     <p:sldId id="283" r:id="rId10"/>
     <p:sldId id="284" r:id="rId11"/>
     <p:sldId id="277" r:id="rId12"/>
-    <p:sldId id="285" r:id="rId13"/>
-    <p:sldId id="270" r:id="rId14"/>
-    <p:sldId id="280" r:id="rId15"/>
+    <p:sldId id="287" r:id="rId13"/>
+    <p:sldId id="288" r:id="rId14"/>
+    <p:sldId id="285" r:id="rId15"/>
+    <p:sldId id="270" r:id="rId16"/>
+    <p:sldId id="280" r:id="rId17"/>
   </p:sldIdLst>
   <p:sldSz cx="12192000" cy="6858000"/>
   <p:notesSz cx="6858000" cy="9144000"/>
@@ -213,7 +215,7 @@
           <a:p>
             <a:fld id="{720C9186-47A3-C54A-A8AF-47B660C0099D}" type="datetimeFigureOut">
               <a:rPr lang="en-US" smtClean="0"/>
-              <a:t>7/5/20</a:t>
+              <a:t>7/6/20</a:t>
             </a:fld>
             <a:endParaRPr lang="en-US"/>
           </a:p>
@@ -642,7 +644,7 @@
           <a:p>
             <a:fld id="{4AAD347D-5ACD-4C99-B74B-A9C85AD731AF}" type="datetimeFigureOut">
               <a:rPr lang="en-US" smtClean="0"/>
-              <a:t>7/5/20</a:t>
+              <a:t>7/6/20</a:t>
             </a:fld>
             <a:endParaRPr lang="en-US" dirty="0"/>
           </a:p>
@@ -842,7 +844,7 @@
           <a:p>
             <a:fld id="{4AAD347D-5ACD-4C99-B74B-A9C85AD731AF}" type="datetimeFigureOut">
               <a:rPr lang="en-US" smtClean="0"/>
-              <a:t>7/5/20</a:t>
+              <a:t>7/6/20</a:t>
             </a:fld>
             <a:endParaRPr lang="en-US" dirty="0"/>
           </a:p>
@@ -1053,7 +1055,7 @@
           <a:p>
             <a:fld id="{4AAD347D-5ACD-4C99-B74B-A9C85AD731AF}" type="datetimeFigureOut">
               <a:rPr lang="en-US" smtClean="0"/>
-              <a:t>7/5/20</a:t>
+              <a:t>7/6/20</a:t>
             </a:fld>
             <a:endParaRPr lang="en-US" dirty="0"/>
           </a:p>
@@ -1310,7 +1312,7 @@
           <a:p>
             <a:fld id="{4AAD347D-5ACD-4C99-B74B-A9C85AD731AF}" type="datetimeFigureOut">
               <a:rPr lang="en-US" smtClean="0"/>
-              <a:t>7/5/20</a:t>
+              <a:t>7/6/20</a:t>
             </a:fld>
             <a:endParaRPr lang="en-US" dirty="0"/>
           </a:p>
@@ -1593,7 +1595,7 @@
           <a:p>
             <a:fld id="{9796027F-7875-4030-9381-8BD8C4F21935}" type="datetimeFigureOut">
               <a:rPr lang="en-US" smtClean="0"/>
-              <a:t>7/5/20</a:t>
+              <a:t>7/6/20</a:t>
             </a:fld>
             <a:endParaRPr lang="en-US" dirty="0"/>
           </a:p>
@@ -1861,7 +1863,7 @@
           <a:p>
             <a:fld id="{4AAD347D-5ACD-4C99-B74B-A9C85AD731AF}" type="datetimeFigureOut">
               <a:rPr lang="en-US" smtClean="0"/>
-              <a:t>7/5/20</a:t>
+              <a:t>7/6/20</a:t>
             </a:fld>
             <a:endParaRPr lang="en-US" dirty="0"/>
           </a:p>
@@ -2282,7 +2284,7 @@
           <a:p>
             <a:fld id="{4AAD347D-5ACD-4C99-B74B-A9C85AD731AF}" type="datetimeFigureOut">
               <a:rPr lang="en-US" smtClean="0"/>
-              <a:t>7/5/20</a:t>
+              <a:t>7/6/20</a:t>
             </a:fld>
             <a:endParaRPr lang="en-US" dirty="0"/>
           </a:p>
@@ -2425,7 +2427,7 @@
           <a:p>
             <a:fld id="{4509A250-FF31-4206-8172-F9D3106AACB1}" type="datetimeFigureOut">
               <a:rPr lang="en-US" smtClean="0"/>
-              <a:t>7/5/20</a:t>
+              <a:t>7/6/20</a:t>
             </a:fld>
             <a:endParaRPr lang="en-US" dirty="0"/>
           </a:p>
@@ -2538,7 +2540,7 @@
           <a:p>
             <a:fld id="{4509A250-FF31-4206-8172-F9D3106AACB1}" type="datetimeFigureOut">
               <a:rPr lang="en-US" smtClean="0"/>
-              <a:t>7/5/20</a:t>
+              <a:t>7/6/20</a:t>
             </a:fld>
             <a:endParaRPr lang="en-US" dirty="0"/>
           </a:p>
@@ -2851,7 +2853,7 @@
           <a:p>
             <a:fld id="{4AAD347D-5ACD-4C99-B74B-A9C85AD731AF}" type="datetimeFigureOut">
               <a:rPr lang="en-US" smtClean="0"/>
-              <a:t>7/5/20</a:t>
+              <a:t>7/6/20</a:t>
             </a:fld>
             <a:endParaRPr lang="en-US" dirty="0"/>
           </a:p>
@@ -3146,7 +3148,7 @@
           <a:p>
             <a:fld id="{4509A250-FF31-4206-8172-F9D3106AACB1}" type="datetimeFigureOut">
               <a:rPr lang="en-US" smtClean="0"/>
-              <a:t>7/5/20</a:t>
+              <a:t>7/6/20</a:t>
             </a:fld>
             <a:endParaRPr lang="en-US" dirty="0"/>
           </a:p>
@@ -3389,7 +3391,7 @@
           <a:p>
             <a:fld id="{4AAD347D-5ACD-4C99-B74B-A9C85AD731AF}" type="datetimeFigureOut">
               <a:rPr lang="en-US" smtClean="0"/>
-              <a:t>7/5/20</a:t>
+              <a:t>7/6/20</a:t>
             </a:fld>
             <a:endParaRPr lang="en-US" dirty="0"/>
           </a:p>
@@ -5764,6 +5766,351 @@
       </p:grpSpPr>
       <p:sp>
         <p:nvSpPr>
+          <p:cNvPr id="2" name="Title 1">
+            <a:extLst>
+              <a:ext uri="{FF2B5EF4-FFF2-40B4-BE49-F238E27FC236}">
+                <a16:creationId xmlns:a16="http://schemas.microsoft.com/office/drawing/2014/main" id="{636CA117-ADC4-1C44-9CCA-3F066E74F0F3}"/>
+              </a:ext>
+            </a:extLst>
+          </p:cNvPr>
+          <p:cNvSpPr>
+            <a:spLocks noGrp="1"/>
+          </p:cNvSpPr>
+          <p:nvPr>
+            <p:ph type="title"/>
+          </p:nvPr>
+        </p:nvSpPr>
+        <p:spPr/>
+        <p:txBody>
+          <a:bodyPr/>
+          <a:lstStyle/>
+          <a:p>
+            <a:r>
+              <a:rPr lang="en-US" dirty="0"/>
+              <a:t>Finding even numbers</a:t>
+            </a:r>
+          </a:p>
+        </p:txBody>
+      </p:sp>
+      <p:sp>
+        <p:nvSpPr>
+          <p:cNvPr id="3" name="Content Placeholder 2">
+            <a:extLst>
+              <a:ext uri="{FF2B5EF4-FFF2-40B4-BE49-F238E27FC236}">
+                <a16:creationId xmlns:a16="http://schemas.microsoft.com/office/drawing/2014/main" id="{65437DCA-198F-894C-A320-4BFEA5B4FB41}"/>
+              </a:ext>
+            </a:extLst>
+          </p:cNvPr>
+          <p:cNvSpPr>
+            <a:spLocks noGrp="1"/>
+          </p:cNvSpPr>
+          <p:nvPr>
+            <p:ph idx="1"/>
+          </p:nvPr>
+        </p:nvSpPr>
+        <p:spPr/>
+        <p:txBody>
+          <a:bodyPr>
+            <a:normAutofit lnSpcReduction="10000"/>
+          </a:bodyPr>
+          <a:lstStyle/>
+          <a:p>
+            <a:r>
+              <a:rPr lang="en-US" dirty="0"/>
+              <a:t>Let’s create 2 integers whose value are 23 and 92</a:t>
+            </a:r>
+          </a:p>
+          <a:p>
+            <a:pPr marL="0" indent="0">
+              <a:buNone/>
+            </a:pPr>
+            <a:r>
+              <a:rPr lang="en-US" dirty="0">
+                <a:latin typeface="Consolas" panose="020B0609020204030204" pitchFamily="49" charset="0"/>
+                <a:cs typeface="Consolas" panose="020B0609020204030204" pitchFamily="49" charset="0"/>
+              </a:rPr>
+              <a:t>num_23: int = 23</a:t>
+            </a:r>
+          </a:p>
+          <a:p>
+            <a:pPr marL="0" indent="0">
+              <a:buNone/>
+            </a:pPr>
+            <a:r>
+              <a:rPr lang="en-US" dirty="0">
+                <a:latin typeface="Consolas" panose="020B0609020204030204" pitchFamily="49" charset="0"/>
+                <a:cs typeface="Consolas" panose="020B0609020204030204" pitchFamily="49" charset="0"/>
+              </a:rPr>
+              <a:t>num_92: int = 92</a:t>
+            </a:r>
+          </a:p>
+          <a:p>
+            <a:endParaRPr lang="en-US" dirty="0"/>
+          </a:p>
+          <a:p>
+            <a:r>
+              <a:rPr lang="en-US" dirty="0"/>
+              <a:t>Let’s print these integers </a:t>
+            </a:r>
+            <a:r>
+              <a:rPr lang="en-US" b="1" dirty="0"/>
+              <a:t>if</a:t>
+            </a:r>
+            <a:r>
+              <a:rPr lang="en-US" dirty="0"/>
+              <a:t> they are even numbers</a:t>
+            </a:r>
+          </a:p>
+          <a:p>
+            <a:pPr marL="0" indent="0">
+              <a:buNone/>
+            </a:pPr>
+            <a:r>
+              <a:rPr lang="en-US" dirty="0">
+                <a:latin typeface="Consolas" panose="020B0609020204030204" pitchFamily="49" charset="0"/>
+                <a:cs typeface="Consolas" panose="020B0609020204030204" pitchFamily="49" charset="0"/>
+              </a:rPr>
+              <a:t>if num_23 % 2 == 0:</a:t>
+            </a:r>
+          </a:p>
+          <a:p>
+            <a:pPr marL="0" indent="0">
+              <a:buNone/>
+            </a:pPr>
+            <a:r>
+              <a:rPr lang="en-US" sz="2800" dirty="0">
+                <a:latin typeface="Consolas" panose="020B0609020204030204" pitchFamily="49" charset="0"/>
+                <a:cs typeface="Consolas" panose="020B0609020204030204" pitchFamily="49" charset="0"/>
+              </a:rPr>
+              <a:t>    print(num_23)</a:t>
+            </a:r>
+          </a:p>
+          <a:p>
+            <a:pPr marL="0" indent="0">
+              <a:buNone/>
+            </a:pPr>
+            <a:r>
+              <a:rPr lang="en-US" dirty="0">
+                <a:latin typeface="Consolas" panose="020B0609020204030204" pitchFamily="49" charset="0"/>
+                <a:cs typeface="Consolas" panose="020B0609020204030204" pitchFamily="49" charset="0"/>
+              </a:rPr>
+              <a:t>if num_92 % 2 == 0:</a:t>
+            </a:r>
+          </a:p>
+          <a:p>
+            <a:pPr marL="457200" lvl="1" indent="0">
+              <a:buNone/>
+            </a:pPr>
+            <a:r>
+              <a:rPr lang="en-US" sz="2800" dirty="0">
+                <a:latin typeface="Consolas" panose="020B0609020204030204" pitchFamily="49" charset="0"/>
+                <a:cs typeface="Consolas" panose="020B0609020204030204" pitchFamily="49" charset="0"/>
+              </a:rPr>
+              <a:t>  print(num_92)</a:t>
+            </a:r>
+          </a:p>
+          <a:p>
+            <a:endParaRPr lang="en-US" dirty="0"/>
+          </a:p>
+        </p:txBody>
+      </p:sp>
+    </p:spTree>
+    <p:extLst>
+      <p:ext uri="{BB962C8B-B14F-4D97-AF65-F5344CB8AC3E}">
+        <p14:creationId xmlns:p14="http://schemas.microsoft.com/office/powerpoint/2010/main" val="3773976740"/>
+      </p:ext>
+    </p:extLst>
+  </p:cSld>
+  <p:clrMapOvr>
+    <a:masterClrMapping/>
+  </p:clrMapOvr>
+</p:sld>
+</file>
+
+<file path=ppt/slides/slide13.xml><?xml version="1.0" encoding="utf-8"?>
+<p:sld xmlns:a="http://schemas.openxmlformats.org/drawingml/2006/main" xmlns:r="http://schemas.openxmlformats.org/officeDocument/2006/relationships" xmlns:p="http://schemas.openxmlformats.org/presentationml/2006/main">
+  <p:cSld>
+    <p:spTree>
+      <p:nvGrpSpPr>
+        <p:cNvPr id="1" name=""/>
+        <p:cNvGrpSpPr/>
+        <p:nvPr/>
+      </p:nvGrpSpPr>
+      <p:grpSpPr>
+        <a:xfrm>
+          <a:off x="0" y="0"/>
+          <a:ext cx="0" cy="0"/>
+          <a:chOff x="0" y="0"/>
+          <a:chExt cx="0" cy="0"/>
+        </a:xfrm>
+      </p:grpSpPr>
+      <p:sp>
+        <p:nvSpPr>
+          <p:cNvPr id="2" name="Title 1">
+            <a:extLst>
+              <a:ext uri="{FF2B5EF4-FFF2-40B4-BE49-F238E27FC236}">
+                <a16:creationId xmlns:a16="http://schemas.microsoft.com/office/drawing/2014/main" id="{F3CCDD2A-D14B-D147-8D9B-3DEDD2961629}"/>
+              </a:ext>
+            </a:extLst>
+          </p:cNvPr>
+          <p:cNvSpPr>
+            <a:spLocks noGrp="1"/>
+          </p:cNvSpPr>
+          <p:nvPr>
+            <p:ph type="title"/>
+          </p:nvPr>
+        </p:nvSpPr>
+        <p:spPr/>
+        <p:txBody>
+          <a:bodyPr/>
+          <a:lstStyle/>
+          <a:p>
+            <a:r>
+              <a:rPr lang="en-US" dirty="0"/>
+              <a:t>To </a:t>
+            </a:r>
+            <a:r>
+              <a:rPr lang="en-US" i="1" dirty="0"/>
+              <a:t>filter</a:t>
+            </a:r>
+            <a:r>
+              <a:rPr lang="en-US" dirty="0"/>
+              <a:t> out even numbers from odd numbers</a:t>
+            </a:r>
+          </a:p>
+        </p:txBody>
+      </p:sp>
+      <p:sp>
+        <p:nvSpPr>
+          <p:cNvPr id="3" name="Content Placeholder 2">
+            <a:extLst>
+              <a:ext uri="{FF2B5EF4-FFF2-40B4-BE49-F238E27FC236}">
+                <a16:creationId xmlns:a16="http://schemas.microsoft.com/office/drawing/2014/main" id="{E2917827-0194-554B-82B3-E7DA6881991E}"/>
+              </a:ext>
+            </a:extLst>
+          </p:cNvPr>
+          <p:cNvSpPr>
+            <a:spLocks noGrp="1"/>
+          </p:cNvSpPr>
+          <p:nvPr>
+            <p:ph idx="1"/>
+          </p:nvPr>
+        </p:nvSpPr>
+        <p:spPr/>
+        <p:txBody>
+          <a:bodyPr/>
+          <a:lstStyle/>
+          <a:p>
+            <a:r>
+              <a:rPr lang="en-US" dirty="0"/>
+              <a:t>We use the </a:t>
+            </a:r>
+            <a:r>
+              <a:rPr lang="en-US" i="1" dirty="0"/>
+              <a:t>keyword </a:t>
+            </a:r>
+            <a:r>
+              <a:rPr lang="en-US" b="1" dirty="0"/>
+              <a:t>if</a:t>
+            </a:r>
+          </a:p>
+          <a:p>
+            <a:r>
+              <a:rPr lang="en-US" dirty="0"/>
+              <a:t>Code for general case:</a:t>
+            </a:r>
+          </a:p>
+          <a:p>
+            <a:pPr marL="0" indent="0">
+              <a:buNone/>
+            </a:pPr>
+            <a:endParaRPr lang="en-US" dirty="0">
+              <a:latin typeface="Consolas" panose="020B0609020204030204" pitchFamily="49" charset="0"/>
+              <a:cs typeface="Consolas" panose="020B0609020204030204" pitchFamily="49" charset="0"/>
+            </a:endParaRPr>
+          </a:p>
+          <a:p>
+            <a:pPr marL="0" indent="0">
+              <a:buNone/>
+            </a:pPr>
+            <a:r>
+              <a:rPr lang="en-US" dirty="0">
+                <a:latin typeface="Consolas" panose="020B0609020204030204" pitchFamily="49" charset="0"/>
+                <a:cs typeface="Consolas" panose="020B0609020204030204" pitchFamily="49" charset="0"/>
+              </a:rPr>
+              <a:t>if number % 2 == 0:</a:t>
+            </a:r>
+          </a:p>
+          <a:p>
+            <a:pPr marL="0" indent="0">
+              <a:buNone/>
+            </a:pPr>
+            <a:r>
+              <a:rPr lang="en-US" dirty="0">
+                <a:latin typeface="Consolas" panose="020B0609020204030204" pitchFamily="49" charset="0"/>
+                <a:cs typeface="Consolas" panose="020B0609020204030204" pitchFamily="49" charset="0"/>
+              </a:rPr>
+              <a:t>	print(“f{number} is even”)</a:t>
+            </a:r>
+          </a:p>
+          <a:p>
+            <a:pPr marL="0" indent="0">
+              <a:buNone/>
+            </a:pPr>
+            <a:r>
+              <a:rPr lang="en-US" dirty="0">
+                <a:latin typeface="Consolas" panose="020B0609020204030204" pitchFamily="49" charset="0"/>
+                <a:cs typeface="Consolas" panose="020B0609020204030204" pitchFamily="49" charset="0"/>
+              </a:rPr>
+              <a:t>else:</a:t>
+            </a:r>
+          </a:p>
+          <a:p>
+            <a:pPr marL="0" indent="0">
+              <a:buNone/>
+            </a:pPr>
+            <a:r>
+              <a:rPr lang="en-US" dirty="0">
+                <a:latin typeface="Consolas" panose="020B0609020204030204" pitchFamily="49" charset="0"/>
+                <a:cs typeface="Consolas" panose="020B0609020204030204" pitchFamily="49" charset="0"/>
+              </a:rPr>
+              <a:t>	print(“f{number} is odd”)</a:t>
+            </a:r>
+          </a:p>
+        </p:txBody>
+      </p:sp>
+    </p:spTree>
+    <p:extLst>
+      <p:ext uri="{BB962C8B-B14F-4D97-AF65-F5344CB8AC3E}">
+        <p14:creationId xmlns:p14="http://schemas.microsoft.com/office/powerpoint/2010/main" val="3852433256"/>
+      </p:ext>
+    </p:extLst>
+  </p:cSld>
+  <p:clrMapOvr>
+    <a:masterClrMapping/>
+  </p:clrMapOvr>
+</p:sld>
+</file>
+
+<file path=ppt/slides/slide14.xml><?xml version="1.0" encoding="utf-8"?>
+<p:sld xmlns:a="http://schemas.openxmlformats.org/drawingml/2006/main" xmlns:r="http://schemas.openxmlformats.org/officeDocument/2006/relationships" xmlns:p="http://schemas.openxmlformats.org/presentationml/2006/main">
+  <p:cSld>
+    <p:spTree>
+      <p:nvGrpSpPr>
+        <p:cNvPr id="1" name=""/>
+        <p:cNvGrpSpPr/>
+        <p:nvPr/>
+      </p:nvGrpSpPr>
+      <p:grpSpPr>
+        <a:xfrm>
+          <a:off x="0" y="0"/>
+          <a:ext cx="0" cy="0"/>
+          <a:chOff x="0" y="0"/>
+          <a:chExt cx="0" cy="0"/>
+        </a:xfrm>
+      </p:grpSpPr>
+      <p:sp>
+        <p:nvSpPr>
           <p:cNvPr id="3" name="Content Placeholder 2">
             <a:extLst>
               <a:ext uri="{FF2B5EF4-FFF2-40B4-BE49-F238E27FC236}">
@@ -6031,7 +6378,7 @@
 </p:sld>
 </file>
 
-<file path=ppt/slides/slide13.xml><?xml version="1.0" encoding="utf-8"?>
+<file path=ppt/slides/slide15.xml><?xml version="1.0" encoding="utf-8"?>
 <p:sld xmlns:a="http://schemas.openxmlformats.org/drawingml/2006/main" xmlns:r="http://schemas.openxmlformats.org/officeDocument/2006/relationships" xmlns:p="http://schemas.openxmlformats.org/presentationml/2006/main">
   <p:cSld>
     <p:spTree>
@@ -6381,7 +6728,7 @@
 </p:sld>
 </file>
 
-<file path=ppt/slides/slide14.xml><?xml version="1.0" encoding="utf-8"?>
+<file path=ppt/slides/slide16.xml><?xml version="1.0" encoding="utf-8"?>
 <p:sld xmlns:a="http://schemas.openxmlformats.org/drawingml/2006/main" xmlns:r="http://schemas.openxmlformats.org/officeDocument/2006/relationships" xmlns:p="http://schemas.openxmlformats.org/presentationml/2006/main">
   <p:cSld>
     <p:spTree>
@@ -15176,41 +15523,6 @@
           </a:p>
           <a:p>
             <a:endParaRPr lang="en-US" dirty="0"/>
-          </a:p>
-        </p:txBody>
-      </p:sp>
-      <p:sp>
-        <p:nvSpPr>
-          <p:cNvPr id="4" name="TextBox 3">
-            <a:extLst>
-              <a:ext uri="{FF2B5EF4-FFF2-40B4-BE49-F238E27FC236}">
-                <a16:creationId xmlns:a16="http://schemas.microsoft.com/office/drawing/2014/main" id="{52B045D1-4088-DF42-9EF3-6369226C0639}"/>
-              </a:ext>
-            </a:extLst>
-          </p:cNvPr>
-          <p:cNvSpPr txBox="1"/>
-          <p:nvPr/>
-        </p:nvSpPr>
-        <p:spPr>
-          <a:xfrm>
-            <a:off x="9898743" y="2292864"/>
-            <a:ext cx="947695" cy="369332"/>
-          </a:xfrm>
-          <a:prstGeom prst="rect">
-            <a:avLst/>
-          </a:prstGeom>
-          <a:noFill/>
-        </p:spPr>
-        <p:txBody>
-          <a:bodyPr wrap="none" rtlCol="0">
-            <a:spAutoFit/>
-          </a:bodyPr>
-          <a:lstStyle/>
-          <a:p>
-            <a:r>
-              <a:rPr lang="en-US" dirty="0"/>
-              <a:t>Input 1</a:t>
-            </a:r>
           </a:p>
         </p:txBody>
       </p:sp>
@@ -16297,7 +16609,7 @@
             <p:ph idx="1"/>
             <p:extLst>
               <p:ext uri="{D42A27DB-BD31-4B8C-83A1-F6EECF244321}">
-                <p14:modId xmlns:p14="http://schemas.microsoft.com/office/powerpoint/2010/main" val="990386959"/>
+                <p14:modId xmlns:p14="http://schemas.microsoft.com/office/powerpoint/2010/main" val="688895324"/>
               </p:ext>
             </p:extLst>
           </p:nvPr>
@@ -16619,7 +16931,7 @@
                             </a:schemeClr>
                           </a:solidFill>
                         </a:rPr>
-                        <a:t>in not in</a:t>
+                        <a:t>in, not in</a:t>
                       </a:r>
                       <a:endParaRPr lang="en-US" i="1" dirty="0">
                         <a:solidFill>
@@ -16671,7 +16983,7 @@
                             </a:schemeClr>
                           </a:solidFill>
                         </a:rPr>
-                        <a:t>is is not</a:t>
+                        <a:t>is, is not</a:t>
                       </a:r>
                       <a:endParaRPr lang="en-US" i="1" dirty="0">
                         <a:solidFill>

</xml_diff>

<commit_message>
Add preamble to #3
</commit_message>
<xml_diff>
--- a/fundamentals/3-Binary Numbers, Operations, Conditionals.pptx
+++ b/fundamentals/3-Binary Numbers, Operations, Conditionals.pptx
@@ -5,25 +5,26 @@
     <p:sldMasterId id="2147483954" r:id="rId1"/>
   </p:sldMasterIdLst>
   <p:notesMasterIdLst>
-    <p:notesMasterId r:id="rId18"/>
+    <p:notesMasterId r:id="rId19"/>
   </p:notesMasterIdLst>
   <p:sldIdLst>
-    <p:sldId id="256" r:id="rId2"/>
-    <p:sldId id="272" r:id="rId3"/>
-    <p:sldId id="273" r:id="rId4"/>
-    <p:sldId id="281" r:id="rId5"/>
-    <p:sldId id="282" r:id="rId6"/>
-    <p:sldId id="276" r:id="rId7"/>
-    <p:sldId id="275" r:id="rId8"/>
-    <p:sldId id="286" r:id="rId9"/>
-    <p:sldId id="283" r:id="rId10"/>
-    <p:sldId id="284" r:id="rId11"/>
-    <p:sldId id="277" r:id="rId12"/>
-    <p:sldId id="287" r:id="rId13"/>
-    <p:sldId id="288" r:id="rId14"/>
-    <p:sldId id="285" r:id="rId15"/>
-    <p:sldId id="270" r:id="rId16"/>
-    <p:sldId id="280" r:id="rId17"/>
+    <p:sldId id="289" r:id="rId2"/>
+    <p:sldId id="256" r:id="rId3"/>
+    <p:sldId id="272" r:id="rId4"/>
+    <p:sldId id="273" r:id="rId5"/>
+    <p:sldId id="281" r:id="rId6"/>
+    <p:sldId id="282" r:id="rId7"/>
+    <p:sldId id="276" r:id="rId8"/>
+    <p:sldId id="275" r:id="rId9"/>
+    <p:sldId id="286" r:id="rId10"/>
+    <p:sldId id="283" r:id="rId11"/>
+    <p:sldId id="284" r:id="rId12"/>
+    <p:sldId id="277" r:id="rId13"/>
+    <p:sldId id="287" r:id="rId14"/>
+    <p:sldId id="288" r:id="rId15"/>
+    <p:sldId id="285" r:id="rId16"/>
+    <p:sldId id="270" r:id="rId17"/>
+    <p:sldId id="280" r:id="rId18"/>
   </p:sldIdLst>
   <p:sldSz cx="12192000" cy="6858000"/>
   <p:notesSz cx="6858000" cy="9144000"/>
@@ -215,7 +216,7 @@
           <a:p>
             <a:fld id="{720C9186-47A3-C54A-A8AF-47B660C0099D}" type="datetimeFigureOut">
               <a:rPr lang="en-US" smtClean="0"/>
-              <a:t>7/14/20</a:t>
+              <a:t>7/18/20</a:t>
             </a:fld>
             <a:endParaRPr lang="en-US"/>
           </a:p>
@@ -644,7 +645,7 @@
           <a:p>
             <a:fld id="{4AAD347D-5ACD-4C99-B74B-A9C85AD731AF}" type="datetimeFigureOut">
               <a:rPr lang="en-US" smtClean="0"/>
-              <a:t>7/14/20</a:t>
+              <a:t>7/18/20</a:t>
             </a:fld>
             <a:endParaRPr lang="en-US" dirty="0"/>
           </a:p>
@@ -844,7 +845,7 @@
           <a:p>
             <a:fld id="{4AAD347D-5ACD-4C99-B74B-A9C85AD731AF}" type="datetimeFigureOut">
               <a:rPr lang="en-US" smtClean="0"/>
-              <a:t>7/14/20</a:t>
+              <a:t>7/18/20</a:t>
             </a:fld>
             <a:endParaRPr lang="en-US" dirty="0"/>
           </a:p>
@@ -1055,7 +1056,7 @@
           <a:p>
             <a:fld id="{4AAD347D-5ACD-4C99-B74B-A9C85AD731AF}" type="datetimeFigureOut">
               <a:rPr lang="en-US" smtClean="0"/>
-              <a:t>7/14/20</a:t>
+              <a:t>7/18/20</a:t>
             </a:fld>
             <a:endParaRPr lang="en-US" dirty="0"/>
           </a:p>
@@ -1312,7 +1313,7 @@
           <a:p>
             <a:fld id="{4AAD347D-5ACD-4C99-B74B-A9C85AD731AF}" type="datetimeFigureOut">
               <a:rPr lang="en-US" smtClean="0"/>
-              <a:t>7/14/20</a:t>
+              <a:t>7/18/20</a:t>
             </a:fld>
             <a:endParaRPr lang="en-US" dirty="0"/>
           </a:p>
@@ -1595,7 +1596,7 @@
           <a:p>
             <a:fld id="{9796027F-7875-4030-9381-8BD8C4F21935}" type="datetimeFigureOut">
               <a:rPr lang="en-US" smtClean="0"/>
-              <a:t>7/14/20</a:t>
+              <a:t>7/18/20</a:t>
             </a:fld>
             <a:endParaRPr lang="en-US" dirty="0"/>
           </a:p>
@@ -1863,7 +1864,7 @@
           <a:p>
             <a:fld id="{4AAD347D-5ACD-4C99-B74B-A9C85AD731AF}" type="datetimeFigureOut">
               <a:rPr lang="en-US" smtClean="0"/>
-              <a:t>7/14/20</a:t>
+              <a:t>7/18/20</a:t>
             </a:fld>
             <a:endParaRPr lang="en-US" dirty="0"/>
           </a:p>
@@ -2284,7 +2285,7 @@
           <a:p>
             <a:fld id="{4AAD347D-5ACD-4C99-B74B-A9C85AD731AF}" type="datetimeFigureOut">
               <a:rPr lang="en-US" smtClean="0"/>
-              <a:t>7/14/20</a:t>
+              <a:t>7/18/20</a:t>
             </a:fld>
             <a:endParaRPr lang="en-US" dirty="0"/>
           </a:p>
@@ -2427,7 +2428,7 @@
           <a:p>
             <a:fld id="{4509A250-FF31-4206-8172-F9D3106AACB1}" type="datetimeFigureOut">
               <a:rPr lang="en-US" smtClean="0"/>
-              <a:t>7/14/20</a:t>
+              <a:t>7/18/20</a:t>
             </a:fld>
             <a:endParaRPr lang="en-US" dirty="0"/>
           </a:p>
@@ -2540,7 +2541,7 @@
           <a:p>
             <a:fld id="{4509A250-FF31-4206-8172-F9D3106AACB1}" type="datetimeFigureOut">
               <a:rPr lang="en-US" smtClean="0"/>
-              <a:t>7/14/20</a:t>
+              <a:t>7/18/20</a:t>
             </a:fld>
             <a:endParaRPr lang="en-US" dirty="0"/>
           </a:p>
@@ -2853,7 +2854,7 @@
           <a:p>
             <a:fld id="{4AAD347D-5ACD-4C99-B74B-A9C85AD731AF}" type="datetimeFigureOut">
               <a:rPr lang="en-US" smtClean="0"/>
-              <a:t>7/14/20</a:t>
+              <a:t>7/18/20</a:t>
             </a:fld>
             <a:endParaRPr lang="en-US" dirty="0"/>
           </a:p>
@@ -3148,7 +3149,7 @@
           <a:p>
             <a:fld id="{4509A250-FF31-4206-8172-F9D3106AACB1}" type="datetimeFigureOut">
               <a:rPr lang="en-US" smtClean="0"/>
-              <a:t>7/14/20</a:t>
+              <a:t>7/18/20</a:t>
             </a:fld>
             <a:endParaRPr lang="en-US" dirty="0"/>
           </a:p>
@@ -3391,7 +3392,7 @@
           <a:p>
             <a:fld id="{4AAD347D-5ACD-4C99-B74B-A9C85AD731AF}" type="datetimeFigureOut">
               <a:rPr lang="en-US" smtClean="0"/>
-              <a:t>7/14/20</a:t>
+              <a:t>7/18/20</a:t>
             </a:fld>
             <a:endParaRPr lang="en-US" dirty="0"/>
           </a:p>
@@ -3812,14 +3813,6 @@
 <file path=ppt/slides/slide1.xml><?xml version="1.0" encoding="utf-8"?>
 <p:sld xmlns:a="http://schemas.openxmlformats.org/drawingml/2006/main" xmlns:r="http://schemas.openxmlformats.org/officeDocument/2006/relationships" xmlns:p="http://schemas.openxmlformats.org/presentationml/2006/main">
   <p:cSld>
-    <p:bg>
-      <p:bgPr>
-        <a:solidFill>
-          <a:schemeClr val="tx1"/>
-        </a:solidFill>
-        <a:effectLst/>
-      </p:bgPr>
-    </p:bg>
     <p:spTree>
       <p:nvGrpSpPr>
         <p:cNvPr id="1" name=""/>
@@ -3839,7 +3832,7 @@
           <p:cNvPr id="2" name="Title 1">
             <a:extLst>
               <a:ext uri="{FF2B5EF4-FFF2-40B4-BE49-F238E27FC236}">
-                <a16:creationId xmlns:a16="http://schemas.microsoft.com/office/drawing/2014/main" id="{43B35290-B2B6-324B-9349-4E6692E228FE}"/>
+                <a16:creationId xmlns:a16="http://schemas.microsoft.com/office/drawing/2014/main" id="{77EEAFB5-5ABE-1E47-87CA-5332E3BE02E8}"/>
               </a:ext>
             </a:extLst>
           </p:cNvPr>
@@ -3847,37 +3840,27 @@
             <a:spLocks noGrp="1"/>
           </p:cNvSpPr>
           <p:nvPr>
-            <p:ph type="ctrTitle"/>
+            <p:ph type="title"/>
           </p:nvPr>
         </p:nvSpPr>
-        <p:spPr>
-          <a:noFill/>
-        </p:spPr>
+        <p:spPr/>
         <p:txBody>
-          <a:bodyPr>
-            <a:normAutofit/>
-          </a:bodyPr>
+          <a:bodyPr/>
           <a:lstStyle/>
           <a:p>
             <a:r>
-              <a:rPr lang="en-US" dirty="0">
-                <a:solidFill>
-                  <a:schemeClr val="bg2">
-                    <a:lumMod val="75000"/>
-                  </a:schemeClr>
-                </a:solidFill>
-              </a:rPr>
-              <a:t>Introduction to programming  (Python)</a:t>
+              <a:rPr lang="en-US" dirty="0"/>
+              <a:t>Preamble</a:t>
             </a:r>
           </a:p>
         </p:txBody>
       </p:sp>
       <p:sp>
         <p:nvSpPr>
-          <p:cNvPr id="3" name="Subtitle 2">
+          <p:cNvPr id="3" name="Content Placeholder 2">
             <a:extLst>
               <a:ext uri="{FF2B5EF4-FFF2-40B4-BE49-F238E27FC236}">
-                <a16:creationId xmlns:a16="http://schemas.microsoft.com/office/drawing/2014/main" id="{E992A13E-D2BD-D347-B675-8C3054F4BE1E}"/>
+                <a16:creationId xmlns:a16="http://schemas.microsoft.com/office/drawing/2014/main" id="{732ED9C9-7C52-A64A-AEDC-0BBED7BDD553}"/>
               </a:ext>
             </a:extLst>
           </p:cNvPr>
@@ -3885,7 +3868,7 @@
             <a:spLocks noGrp="1"/>
           </p:cNvSpPr>
           <p:nvPr>
-            <p:ph type="subTitle" idx="1"/>
+            <p:ph idx="1"/>
           </p:nvPr>
         </p:nvSpPr>
         <p:spPr/>
@@ -3894,26 +3877,52 @@
           <a:lstStyle/>
           <a:p>
             <a:r>
-              <a:rPr lang="en-US" dirty="0">
-                <a:solidFill>
-                  <a:schemeClr val="bg2">
-                    <a:lumMod val="75000"/>
-                  </a:schemeClr>
-                </a:solidFill>
-              </a:rPr>
-              <a:t>Session #3</a:t>
-            </a:r>
-          </a:p>
-          <a:p>
-            <a:r>
-              <a:rPr lang="en-US" dirty="0">
-                <a:solidFill>
-                  <a:schemeClr val="bg2">
-                    <a:lumMod val="75000"/>
-                  </a:schemeClr>
-                </a:solidFill>
-              </a:rPr>
-              <a:t>Binary numbers, Operations</a:t>
+              <a:rPr lang="en-US" dirty="0"/>
+              <a:t>The sessions will be recorded</a:t>
+            </a:r>
+          </a:p>
+          <a:p>
+            <a:r>
+              <a:rPr lang="en-US" dirty="0"/>
+              <a:t>Every </a:t>
+            </a:r>
+            <a:r>
+              <a:rPr lang="en-US" b="1" dirty="0"/>
+              <a:t>Saturday</a:t>
+            </a:r>
+            <a:r>
+              <a:rPr lang="en-US" dirty="0"/>
+              <a:t> at </a:t>
+            </a:r>
+            <a:r>
+              <a:rPr lang="en-US" b="1" dirty="0"/>
+              <a:t>14:00 GMT </a:t>
+            </a:r>
+            <a:r>
+              <a:rPr lang="en-US" dirty="0"/>
+              <a:t>until we complete the </a:t>
+            </a:r>
+            <a:r>
+              <a:rPr lang="en-US" i="1" dirty="0"/>
+              <a:t>fundamentals</a:t>
+            </a:r>
+          </a:p>
+          <a:p>
+            <a:r>
+              <a:rPr lang="en-US" dirty="0"/>
+              <a:t>Learning is the sole purpose</a:t>
+            </a:r>
+          </a:p>
+          <a:p>
+            <a:r>
+              <a:rPr lang="en-US" dirty="0"/>
+              <a:t>Ask questions</a:t>
+            </a:r>
+          </a:p>
+          <a:p>
+            <a:r>
+              <a:rPr lang="en-US"/>
+              <a:t>Get into programming mindset</a:t>
             </a:r>
           </a:p>
         </p:txBody>
@@ -3921,17 +3930,160 @@
     </p:spTree>
     <p:extLst>
       <p:ext uri="{BB962C8B-B14F-4D97-AF65-F5344CB8AC3E}">
-        <p14:creationId xmlns:p14="http://schemas.microsoft.com/office/powerpoint/2010/main" val="1904483027"/>
+        <p14:creationId xmlns:p14="http://schemas.microsoft.com/office/powerpoint/2010/main" val="374358009"/>
       </p:ext>
     </p:extLst>
   </p:cSld>
   <p:clrMapOvr>
-    <a:overrideClrMapping bg1="dk1" tx1="lt1" bg2="dk2" tx2="lt2" accent1="accent1" accent2="accent2" accent3="accent3" accent4="accent4" accent5="accent5" accent6="accent6" hlink="hlink" folHlink="folHlink"/>
+    <a:masterClrMapping/>
   </p:clrMapOvr>
 </p:sld>
 </file>
 
 <file path=ppt/slides/slide10.xml><?xml version="1.0" encoding="utf-8"?>
+<p:sld xmlns:a="http://schemas.openxmlformats.org/drawingml/2006/main" xmlns:r="http://schemas.openxmlformats.org/officeDocument/2006/relationships" xmlns:p="http://schemas.openxmlformats.org/presentationml/2006/main">
+  <p:cSld>
+    <p:spTree>
+      <p:nvGrpSpPr>
+        <p:cNvPr id="1" name=""/>
+        <p:cNvGrpSpPr/>
+        <p:nvPr/>
+      </p:nvGrpSpPr>
+      <p:grpSpPr>
+        <a:xfrm>
+          <a:off x="0" y="0"/>
+          <a:ext cx="0" cy="0"/>
+          <a:chOff x="0" y="0"/>
+          <a:chExt cx="0" cy="0"/>
+        </a:xfrm>
+      </p:grpSpPr>
+      <p:sp>
+        <p:nvSpPr>
+          <p:cNvPr id="2" name="Title 1">
+            <a:extLst>
+              <a:ext uri="{FF2B5EF4-FFF2-40B4-BE49-F238E27FC236}">
+                <a16:creationId xmlns:a16="http://schemas.microsoft.com/office/drawing/2014/main" id="{B3F7E8BF-4C03-5F44-8331-DBC550527E3A}"/>
+              </a:ext>
+            </a:extLst>
+          </p:cNvPr>
+          <p:cNvSpPr>
+            <a:spLocks noGrp="1"/>
+          </p:cNvSpPr>
+          <p:nvPr>
+            <p:ph type="title"/>
+          </p:nvPr>
+        </p:nvSpPr>
+        <p:spPr/>
+        <p:txBody>
+          <a:bodyPr/>
+          <a:lstStyle/>
+          <a:p>
+            <a:r>
+              <a:rPr lang="en-US" dirty="0"/>
+              <a:t>Control flow in a program</a:t>
+            </a:r>
+          </a:p>
+        </p:txBody>
+      </p:sp>
+      <p:sp>
+        <p:nvSpPr>
+          <p:cNvPr id="3" name="Content Placeholder 2">
+            <a:extLst>
+              <a:ext uri="{FF2B5EF4-FFF2-40B4-BE49-F238E27FC236}">
+                <a16:creationId xmlns:a16="http://schemas.microsoft.com/office/drawing/2014/main" id="{CE0E962A-AD68-464B-AB24-5A4AF546DAA3}"/>
+              </a:ext>
+            </a:extLst>
+          </p:cNvPr>
+          <p:cNvSpPr>
+            <a:spLocks noGrp="1"/>
+          </p:cNvSpPr>
+          <p:nvPr>
+            <p:ph idx="1"/>
+          </p:nvPr>
+        </p:nvSpPr>
+        <p:spPr/>
+        <p:txBody>
+          <a:bodyPr/>
+          <a:lstStyle/>
+          <a:p>
+            <a:r>
+              <a:rPr lang="en-US" dirty="0"/>
+              <a:t>When the program is started, the control is given to a special </a:t>
+            </a:r>
+            <a:r>
+              <a:rPr lang="en-US" i="1" dirty="0"/>
+              <a:t>function</a:t>
+            </a:r>
+            <a:r>
+              <a:rPr lang="en-US" dirty="0"/>
+              <a:t> called </a:t>
+            </a:r>
+            <a:r>
+              <a:rPr lang="en-US" b="1" dirty="0"/>
+              <a:t>main()</a:t>
+            </a:r>
+            <a:endParaRPr lang="en-US" dirty="0"/>
+          </a:p>
+          <a:p>
+            <a:r>
+              <a:rPr lang="en-US" dirty="0"/>
+              <a:t>From here, the control keeps </a:t>
+            </a:r>
+            <a:r>
+              <a:rPr lang="en-US" i="1" dirty="0"/>
+              <a:t>flowing</a:t>
+            </a:r>
+            <a:r>
+              <a:rPr lang="en-US" dirty="0"/>
+              <a:t> </a:t>
+            </a:r>
+            <a:r>
+              <a:rPr lang="en-US" i="1" dirty="0"/>
+              <a:t>sequentially </a:t>
+            </a:r>
+            <a:r>
+              <a:rPr lang="en-US" dirty="0"/>
+              <a:t>from one instruction to the next until it meets a </a:t>
+            </a:r>
+            <a:r>
+              <a:rPr lang="en-US" i="1" dirty="0"/>
+              <a:t>branch</a:t>
+            </a:r>
+            <a:r>
+              <a:rPr lang="en-US" dirty="0"/>
+              <a:t> instruction</a:t>
+            </a:r>
+          </a:p>
+          <a:p>
+            <a:r>
+              <a:rPr lang="en-US" dirty="0"/>
+              <a:t>It then branches out to some destination and continues to execute sequentially until it meets another </a:t>
+            </a:r>
+            <a:r>
+              <a:rPr lang="en-US" i="1" dirty="0"/>
+              <a:t>branch</a:t>
+            </a:r>
+            <a:r>
+              <a:rPr lang="en-US" dirty="0"/>
+              <a:t> instruction</a:t>
+            </a:r>
+          </a:p>
+        </p:txBody>
+      </p:sp>
+    </p:spTree>
+    <p:extLst>
+      <p:ext uri="{BB962C8B-B14F-4D97-AF65-F5344CB8AC3E}">
+        <p14:creationId xmlns:p14="http://schemas.microsoft.com/office/powerpoint/2010/main" val="1622771348"/>
+      </p:ext>
+    </p:extLst>
+  </p:cSld>
+  <p:clrMapOvr>
+    <a:masterClrMapping/>
+  </p:clrMapOvr>
+</p:sld>
+</file>
+
+<file path=ppt/slides/slide11.xml><?xml version="1.0" encoding="utf-8"?>
 <p:sld xmlns:a="http://schemas.openxmlformats.org/drawingml/2006/main" xmlns:r="http://schemas.openxmlformats.org/officeDocument/2006/relationships" xmlns:p="http://schemas.openxmlformats.org/presentationml/2006/main">
   <p:cSld>
     <p:spTree>
@@ -4843,7 +4995,7 @@
 </p:sld>
 </file>
 
-<file path=ppt/slides/slide11.xml><?xml version="1.0" encoding="utf-8"?>
+<file path=ppt/slides/slide12.xml><?xml version="1.0" encoding="utf-8"?>
 <p:sld xmlns:a="http://schemas.openxmlformats.org/drawingml/2006/main" xmlns:r="http://schemas.openxmlformats.org/officeDocument/2006/relationships" xmlns:p="http://schemas.openxmlformats.org/presentationml/2006/main">
   <p:cSld>
     <p:spTree>
@@ -5747,7 +5899,7 @@
 </p:sld>
 </file>
 
-<file path=ppt/slides/slide12.xml><?xml version="1.0" encoding="utf-8"?>
+<file path=ppt/slides/slide13.xml><?xml version="1.0" encoding="utf-8"?>
 <p:sld xmlns:a="http://schemas.openxmlformats.org/drawingml/2006/main" xmlns:r="http://schemas.openxmlformats.org/officeDocument/2006/relationships" xmlns:p="http://schemas.openxmlformats.org/presentationml/2006/main">
   <p:cSld>
     <p:spTree>
@@ -5927,7 +6079,7 @@
 </p:sld>
 </file>
 
-<file path=ppt/slides/slide13.xml><?xml version="1.0" encoding="utf-8"?>
+<file path=ppt/slides/slide14.xml><?xml version="1.0" encoding="utf-8"?>
 <p:sld xmlns:a="http://schemas.openxmlformats.org/drawingml/2006/main" xmlns:r="http://schemas.openxmlformats.org/officeDocument/2006/relationships" xmlns:p="http://schemas.openxmlformats.org/presentationml/2006/main">
   <p:cSld>
     <p:spTree>
@@ -6092,7 +6244,7 @@
 </p:sld>
 </file>
 
-<file path=ppt/slides/slide14.xml><?xml version="1.0" encoding="utf-8"?>
+<file path=ppt/slides/slide15.xml><?xml version="1.0" encoding="utf-8"?>
 <p:sld xmlns:a="http://schemas.openxmlformats.org/drawingml/2006/main" xmlns:r="http://schemas.openxmlformats.org/officeDocument/2006/relationships" xmlns:p="http://schemas.openxmlformats.org/presentationml/2006/main">
   <p:cSld>
     <p:spTree>
@@ -6378,7 +6530,7 @@
 </p:sld>
 </file>
 
-<file path=ppt/slides/slide15.xml><?xml version="1.0" encoding="utf-8"?>
+<file path=ppt/slides/slide16.xml><?xml version="1.0" encoding="utf-8"?>
 <p:sld xmlns:a="http://schemas.openxmlformats.org/drawingml/2006/main" xmlns:r="http://schemas.openxmlformats.org/officeDocument/2006/relationships" xmlns:p="http://schemas.openxmlformats.org/presentationml/2006/main">
   <p:cSld>
     <p:spTree>
@@ -6728,7 +6880,7 @@
 </p:sld>
 </file>
 
-<file path=ppt/slides/slide16.xml><?xml version="1.0" encoding="utf-8"?>
+<file path=ppt/slides/slide17.xml><?xml version="1.0" encoding="utf-8"?>
 <p:sld xmlns:a="http://schemas.openxmlformats.org/drawingml/2006/main" xmlns:r="http://schemas.openxmlformats.org/officeDocument/2006/relationships" xmlns:p="http://schemas.openxmlformats.org/presentationml/2006/main">
   <p:cSld>
     <p:spTree>
@@ -6891,6 +7043,128 @@
 </file>
 
 <file path=ppt/slides/slide2.xml><?xml version="1.0" encoding="utf-8"?>
+<p:sld xmlns:a="http://schemas.openxmlformats.org/drawingml/2006/main" xmlns:r="http://schemas.openxmlformats.org/officeDocument/2006/relationships" xmlns:p="http://schemas.openxmlformats.org/presentationml/2006/main">
+  <p:cSld>
+    <p:bg>
+      <p:bgPr>
+        <a:solidFill>
+          <a:schemeClr val="tx1"/>
+        </a:solidFill>
+        <a:effectLst/>
+      </p:bgPr>
+    </p:bg>
+    <p:spTree>
+      <p:nvGrpSpPr>
+        <p:cNvPr id="1" name=""/>
+        <p:cNvGrpSpPr/>
+        <p:nvPr/>
+      </p:nvGrpSpPr>
+      <p:grpSpPr>
+        <a:xfrm>
+          <a:off x="0" y="0"/>
+          <a:ext cx="0" cy="0"/>
+          <a:chOff x="0" y="0"/>
+          <a:chExt cx="0" cy="0"/>
+        </a:xfrm>
+      </p:grpSpPr>
+      <p:sp>
+        <p:nvSpPr>
+          <p:cNvPr id="2" name="Title 1">
+            <a:extLst>
+              <a:ext uri="{FF2B5EF4-FFF2-40B4-BE49-F238E27FC236}">
+                <a16:creationId xmlns:a16="http://schemas.microsoft.com/office/drawing/2014/main" id="{43B35290-B2B6-324B-9349-4E6692E228FE}"/>
+              </a:ext>
+            </a:extLst>
+          </p:cNvPr>
+          <p:cNvSpPr>
+            <a:spLocks noGrp="1"/>
+          </p:cNvSpPr>
+          <p:nvPr>
+            <p:ph type="ctrTitle"/>
+          </p:nvPr>
+        </p:nvSpPr>
+        <p:spPr>
+          <a:noFill/>
+        </p:spPr>
+        <p:txBody>
+          <a:bodyPr>
+            <a:normAutofit/>
+          </a:bodyPr>
+          <a:lstStyle/>
+          <a:p>
+            <a:r>
+              <a:rPr lang="en-US" dirty="0">
+                <a:solidFill>
+                  <a:schemeClr val="bg2">
+                    <a:lumMod val="75000"/>
+                  </a:schemeClr>
+                </a:solidFill>
+              </a:rPr>
+              <a:t>Introduction to programming  (Python)</a:t>
+            </a:r>
+          </a:p>
+        </p:txBody>
+      </p:sp>
+      <p:sp>
+        <p:nvSpPr>
+          <p:cNvPr id="3" name="Subtitle 2">
+            <a:extLst>
+              <a:ext uri="{FF2B5EF4-FFF2-40B4-BE49-F238E27FC236}">
+                <a16:creationId xmlns:a16="http://schemas.microsoft.com/office/drawing/2014/main" id="{E992A13E-D2BD-D347-B675-8C3054F4BE1E}"/>
+              </a:ext>
+            </a:extLst>
+          </p:cNvPr>
+          <p:cNvSpPr>
+            <a:spLocks noGrp="1"/>
+          </p:cNvSpPr>
+          <p:nvPr>
+            <p:ph type="subTitle" idx="1"/>
+          </p:nvPr>
+        </p:nvSpPr>
+        <p:spPr/>
+        <p:txBody>
+          <a:bodyPr/>
+          <a:lstStyle/>
+          <a:p>
+            <a:r>
+              <a:rPr lang="en-US" dirty="0">
+                <a:solidFill>
+                  <a:schemeClr val="bg2">
+                    <a:lumMod val="75000"/>
+                  </a:schemeClr>
+                </a:solidFill>
+              </a:rPr>
+              <a:t>Session #3</a:t>
+            </a:r>
+          </a:p>
+          <a:p>
+            <a:r>
+              <a:rPr lang="en-US" dirty="0">
+                <a:solidFill>
+                  <a:schemeClr val="bg2">
+                    <a:lumMod val="75000"/>
+                  </a:schemeClr>
+                </a:solidFill>
+              </a:rPr>
+              <a:t>Binary numbers, Operations</a:t>
+            </a:r>
+          </a:p>
+        </p:txBody>
+      </p:sp>
+    </p:spTree>
+    <p:extLst>
+      <p:ext uri="{BB962C8B-B14F-4D97-AF65-F5344CB8AC3E}">
+        <p14:creationId xmlns:p14="http://schemas.microsoft.com/office/powerpoint/2010/main" val="1904483027"/>
+      </p:ext>
+    </p:extLst>
+  </p:cSld>
+  <p:clrMapOvr>
+    <a:overrideClrMapping bg1="dk1" tx1="lt1" bg2="dk2" tx2="lt2" accent1="accent1" accent2="accent2" accent3="accent3" accent4="accent4" accent5="accent5" accent6="accent6" hlink="hlink" folHlink="folHlink"/>
+  </p:clrMapOvr>
+</p:sld>
+</file>
+
+<file path=ppt/slides/slide3.xml><?xml version="1.0" encoding="utf-8"?>
 <p:sld xmlns:a="http://schemas.openxmlformats.org/drawingml/2006/main" xmlns:r="http://schemas.openxmlformats.org/officeDocument/2006/relationships" xmlns:p="http://schemas.openxmlformats.org/presentationml/2006/main">
   <p:cSld>
     <p:spTree>
@@ -11281,7 +11555,7 @@
 </p:sld>
 </file>
 
-<file path=ppt/slides/slide3.xml><?xml version="1.0" encoding="utf-8"?>
+<file path=ppt/slides/slide4.xml><?xml version="1.0" encoding="utf-8"?>
 <p:sld xmlns:a="http://schemas.openxmlformats.org/drawingml/2006/main" xmlns:r="http://schemas.openxmlformats.org/officeDocument/2006/relationships" xmlns:p="http://schemas.openxmlformats.org/presentationml/2006/main">
   <p:cSld>
     <p:spTree>
@@ -15373,7 +15647,7 @@
 </p:sld>
 </file>
 
-<file path=ppt/slides/slide4.xml><?xml version="1.0" encoding="utf-8"?>
+<file path=ppt/slides/slide5.xml><?xml version="1.0" encoding="utf-8"?>
 <p:sld xmlns:a="http://schemas.openxmlformats.org/drawingml/2006/main" xmlns:r="http://schemas.openxmlformats.org/officeDocument/2006/relationships" xmlns:p="http://schemas.openxmlformats.org/presentationml/2006/main">
   <p:cSld>
     <p:spTree>
@@ -15896,7 +16170,7 @@
 </p:sld>
 </file>
 
-<file path=ppt/slides/slide5.xml><?xml version="1.0" encoding="utf-8"?>
+<file path=ppt/slides/slide6.xml><?xml version="1.0" encoding="utf-8"?>
 <p:sld xmlns:a="http://schemas.openxmlformats.org/drawingml/2006/main" xmlns:r="http://schemas.openxmlformats.org/officeDocument/2006/relationships" xmlns:p="http://schemas.openxmlformats.org/presentationml/2006/main">
   <p:cSld>
     <p:spTree>
@@ -16095,7 +16369,7 @@
 </p:sld>
 </file>
 
-<file path=ppt/slides/slide6.xml><?xml version="1.0" encoding="utf-8"?>
+<file path=ppt/slides/slide7.xml><?xml version="1.0" encoding="utf-8"?>
 <p:sld xmlns:a="http://schemas.openxmlformats.org/drawingml/2006/main" xmlns:r="http://schemas.openxmlformats.org/officeDocument/2006/relationships" xmlns:p="http://schemas.openxmlformats.org/presentationml/2006/main">
   <p:cSld>
     <p:spTree>
@@ -16541,7 +16815,7 @@
 </p:sld>
 </file>
 
-<file path=ppt/slides/slide7.xml><?xml version="1.0" encoding="utf-8"?>
+<file path=ppt/slides/slide8.xml><?xml version="1.0" encoding="utf-8"?>
 <p:sld xmlns:a="http://schemas.openxmlformats.org/drawingml/2006/main" xmlns:r="http://schemas.openxmlformats.org/officeDocument/2006/relationships" xmlns:p="http://schemas.openxmlformats.org/presentationml/2006/main">
   <p:cSld>
     <p:spTree>
@@ -17072,7 +17346,7 @@
 </p:sld>
 </file>
 
-<file path=ppt/slides/slide8.xml><?xml version="1.0" encoding="utf-8"?>
+<file path=ppt/slides/slide9.xml><?xml version="1.0" encoding="utf-8"?>
 <p:sld xmlns:a="http://schemas.openxmlformats.org/drawingml/2006/main" xmlns:r="http://schemas.openxmlformats.org/officeDocument/2006/relationships" xmlns:p="http://schemas.openxmlformats.org/presentationml/2006/main">
   <p:cSld>
     <p:spTree>
@@ -18121,149 +18395,6 @@
 </p:sld>
 </file>
 
-<file path=ppt/slides/slide9.xml><?xml version="1.0" encoding="utf-8"?>
-<p:sld xmlns:a="http://schemas.openxmlformats.org/drawingml/2006/main" xmlns:r="http://schemas.openxmlformats.org/officeDocument/2006/relationships" xmlns:p="http://schemas.openxmlformats.org/presentationml/2006/main">
-  <p:cSld>
-    <p:spTree>
-      <p:nvGrpSpPr>
-        <p:cNvPr id="1" name=""/>
-        <p:cNvGrpSpPr/>
-        <p:nvPr/>
-      </p:nvGrpSpPr>
-      <p:grpSpPr>
-        <a:xfrm>
-          <a:off x="0" y="0"/>
-          <a:ext cx="0" cy="0"/>
-          <a:chOff x="0" y="0"/>
-          <a:chExt cx="0" cy="0"/>
-        </a:xfrm>
-      </p:grpSpPr>
-      <p:sp>
-        <p:nvSpPr>
-          <p:cNvPr id="2" name="Title 1">
-            <a:extLst>
-              <a:ext uri="{FF2B5EF4-FFF2-40B4-BE49-F238E27FC236}">
-                <a16:creationId xmlns:a16="http://schemas.microsoft.com/office/drawing/2014/main" id="{B3F7E8BF-4C03-5F44-8331-DBC550527E3A}"/>
-              </a:ext>
-            </a:extLst>
-          </p:cNvPr>
-          <p:cNvSpPr>
-            <a:spLocks noGrp="1"/>
-          </p:cNvSpPr>
-          <p:nvPr>
-            <p:ph type="title"/>
-          </p:nvPr>
-        </p:nvSpPr>
-        <p:spPr/>
-        <p:txBody>
-          <a:bodyPr/>
-          <a:lstStyle/>
-          <a:p>
-            <a:r>
-              <a:rPr lang="en-US" dirty="0"/>
-              <a:t>Control flow in a program</a:t>
-            </a:r>
-          </a:p>
-        </p:txBody>
-      </p:sp>
-      <p:sp>
-        <p:nvSpPr>
-          <p:cNvPr id="3" name="Content Placeholder 2">
-            <a:extLst>
-              <a:ext uri="{FF2B5EF4-FFF2-40B4-BE49-F238E27FC236}">
-                <a16:creationId xmlns:a16="http://schemas.microsoft.com/office/drawing/2014/main" id="{CE0E962A-AD68-464B-AB24-5A4AF546DAA3}"/>
-              </a:ext>
-            </a:extLst>
-          </p:cNvPr>
-          <p:cNvSpPr>
-            <a:spLocks noGrp="1"/>
-          </p:cNvSpPr>
-          <p:nvPr>
-            <p:ph idx="1"/>
-          </p:nvPr>
-        </p:nvSpPr>
-        <p:spPr/>
-        <p:txBody>
-          <a:bodyPr/>
-          <a:lstStyle/>
-          <a:p>
-            <a:r>
-              <a:rPr lang="en-US" dirty="0"/>
-              <a:t>When the program is started, the control is given to a special </a:t>
-            </a:r>
-            <a:r>
-              <a:rPr lang="en-US" i="1" dirty="0"/>
-              <a:t>function</a:t>
-            </a:r>
-            <a:r>
-              <a:rPr lang="en-US" dirty="0"/>
-              <a:t> called </a:t>
-            </a:r>
-            <a:r>
-              <a:rPr lang="en-US" b="1" dirty="0"/>
-              <a:t>main()</a:t>
-            </a:r>
-            <a:endParaRPr lang="en-US" dirty="0"/>
-          </a:p>
-          <a:p>
-            <a:r>
-              <a:rPr lang="en-US" dirty="0"/>
-              <a:t>From here, the control keeps </a:t>
-            </a:r>
-            <a:r>
-              <a:rPr lang="en-US" i="1" dirty="0"/>
-              <a:t>flowing</a:t>
-            </a:r>
-            <a:r>
-              <a:rPr lang="en-US" dirty="0"/>
-              <a:t> </a:t>
-            </a:r>
-            <a:r>
-              <a:rPr lang="en-US" i="1" dirty="0"/>
-              <a:t>sequentially </a:t>
-            </a:r>
-            <a:r>
-              <a:rPr lang="en-US" dirty="0"/>
-              <a:t>from one instruction to the next until it meets a </a:t>
-            </a:r>
-            <a:r>
-              <a:rPr lang="en-US" i="1" dirty="0"/>
-              <a:t>branch</a:t>
-            </a:r>
-            <a:r>
-              <a:rPr lang="en-US" dirty="0"/>
-              <a:t> instruction</a:t>
-            </a:r>
-          </a:p>
-          <a:p>
-            <a:r>
-              <a:rPr lang="en-US" dirty="0"/>
-              <a:t>It then branches out to some destination and continues to execute sequentially until it meets another </a:t>
-            </a:r>
-            <a:r>
-              <a:rPr lang="en-US" i="1" dirty="0"/>
-              <a:t>branch</a:t>
-            </a:r>
-            <a:r>
-              <a:rPr lang="en-US" dirty="0"/>
-              <a:t> instruction</a:t>
-            </a:r>
-          </a:p>
-        </p:txBody>
-      </p:sp>
-    </p:spTree>
-    <p:extLst>
-      <p:ext uri="{BB962C8B-B14F-4D97-AF65-F5344CB8AC3E}">
-        <p14:creationId xmlns:p14="http://schemas.microsoft.com/office/powerpoint/2010/main" val="1622771348"/>
-      </p:ext>
-    </p:extLst>
-  </p:cSld>
-  <p:clrMapOvr>
-    <a:masterClrMapping/>
-  </p:clrMapOvr>
-</p:sld>
-</file>
-
 <file path=ppt/theme/theme1.xml><?xml version="1.0" encoding="utf-8"?>
 <a:theme xmlns:a="http://schemas.openxmlformats.org/drawingml/2006/main" name="Office Theme">
   <a:themeElements>

</xml_diff>

<commit_message>
Edits to session # 3,4,5
</commit_message>
<xml_diff>
--- a/fundamentals/3-Binary Numbers, Operations, Conditionals.pptx
+++ b/fundamentals/3-Binary Numbers, Operations, Conditionals.pptx
@@ -3921,7 +3921,7 @@
           </a:p>
           <a:p>
             <a:r>
-              <a:rPr lang="en-US"/>
+              <a:rPr lang="en-US" dirty="0"/>
               <a:t>Get into programming mindset</a:t>
             </a:r>
           </a:p>
@@ -5648,7 +5648,7 @@
                 <a:latin typeface="Consolas" panose="020B0609020204030204" pitchFamily="49" charset="0"/>
                 <a:cs typeface="Consolas" panose="020B0609020204030204" pitchFamily="49" charset="0"/>
               </a:rPr>
-              <a:t>If</a:t>
+              <a:t>if</a:t>
             </a:r>
             <a:r>
               <a:rPr lang="en-US" sz="1600" dirty="0">
@@ -6382,12 +6382,16 @@
               <a:buAutoNum type="arabicPeriod"/>
             </a:pPr>
             <a:r>
-              <a:rPr lang="en-US" dirty="0">
+              <a:rPr lang="en-US">
                 <a:latin typeface="Consolas" panose="020B0609020204030204" pitchFamily="49" charset="0"/>
                 <a:cs typeface="Consolas" panose="020B0609020204030204" pitchFamily="49" charset="0"/>
               </a:rPr>
-              <a:t>else</a:t>
-            </a:r>
+              <a:t>else:</a:t>
+            </a:r>
+            <a:endParaRPr lang="en-US" dirty="0">
+              <a:latin typeface="Consolas" panose="020B0609020204030204" pitchFamily="49" charset="0"/>
+              <a:cs typeface="Consolas" panose="020B0609020204030204" pitchFamily="49" charset="0"/>
+            </a:endParaRPr>
           </a:p>
           <a:p>
             <a:pPr marL="514350" indent="-514350">

</xml_diff>